<commit_message>
New version of the few slides for the intro
</commit_message>
<xml_diff>
--- a/Lesson 4.3 -  python.pptx
+++ b/Lesson 4.3 -  python.pptx
@@ -5,35 +5,24 @@
     <p:sldMasterId id="2147483677" r:id="rId1"/>
   </p:sldMasterIdLst>
   <p:notesMasterIdLst>
-    <p:notesMasterId r:id="rId20"/>
+    <p:notesMasterId r:id="rId9"/>
   </p:notesMasterIdLst>
   <p:handoutMasterIdLst>
-    <p:handoutMasterId r:id="rId21"/>
+    <p:handoutMasterId r:id="rId10"/>
   </p:handoutMasterIdLst>
   <p:sldIdLst>
     <p:sldId id="265" r:id="rId2"/>
     <p:sldId id="272" r:id="rId3"/>
     <p:sldId id="273" r:id="rId4"/>
     <p:sldId id="275" r:id="rId5"/>
-    <p:sldId id="274" r:id="rId6"/>
-    <p:sldId id="276" r:id="rId7"/>
-    <p:sldId id="277" r:id="rId8"/>
-    <p:sldId id="278" r:id="rId9"/>
-    <p:sldId id="279" r:id="rId10"/>
-    <p:sldId id="281" r:id="rId11"/>
-    <p:sldId id="280" r:id="rId12"/>
-    <p:sldId id="282" r:id="rId13"/>
-    <p:sldId id="283" r:id="rId14"/>
-    <p:sldId id="284" r:id="rId15"/>
-    <p:sldId id="285" r:id="rId16"/>
-    <p:sldId id="286" r:id="rId17"/>
-    <p:sldId id="288" r:id="rId18"/>
-    <p:sldId id="287" r:id="rId19"/>
+    <p:sldId id="278" r:id="rId6"/>
+    <p:sldId id="281" r:id="rId7"/>
+    <p:sldId id="282" r:id="rId8"/>
   </p:sldIdLst>
   <p:sldSz cx="9144000" cy="6858000" type="screen4x3"/>
   <p:notesSz cx="6858000" cy="9144000"/>
   <p:custDataLst>
-    <p:tags r:id="rId22"/>
+    <p:tags r:id="rId11"/>
   </p:custDataLst>
   <p:defaultTextStyle>
     <a:defPPr>
@@ -246,7 +235,7 @@
             <a:fld id="{95217433-3A9C-422B-BF37-C8C618417591}" type="datetimeFigureOut">
               <a:rPr lang="es-ES" smtClean="0"/>
               <a:pPr/>
-              <a:t>29/1/16</a:t>
+              <a:t>4/2/16</a:t>
             </a:fld>
             <a:endParaRPr lang="es-ES"/>
           </a:p>
@@ -413,7 +402,7 @@
             <a:fld id="{16EB4444-82EE-43D0-A47E-CCAB1C3B537D}" type="datetimeFigureOut">
               <a:rPr lang="es-ES" smtClean="0"/>
               <a:pPr/>
-              <a:t>29/1/16</a:t>
+              <a:t>4/2/16</a:t>
             </a:fld>
             <a:endParaRPr lang="es-ES"/>
           </a:p>
@@ -3046,7 +3035,7 @@
                   </a:schemeClr>
                 </a:solidFill>
               </a:rPr>
-              <a:t>Jean-Didier </a:t>
+              <a:t>Jaime </a:t>
             </a:r>
             <a:r>
               <a:rPr lang="en-GB" sz="2000" i="1" dirty="0" err="1" smtClean="0">
@@ -3057,10 +3046,10 @@
                   </a:schemeClr>
                 </a:solidFill>
               </a:rPr>
-              <a:t>Maréchal</a:t>
-            </a:r>
-            <a:r>
-              <a:rPr lang="en-GB" sz="2000" i="1" dirty="0" smtClean="0">
+              <a:t>Rodr</a:t>
+            </a:r>
+            <a:r>
+              <a:rPr lang="es-ES" sz="2000" i="1" dirty="0" err="1" smtClean="0">
                 <a:solidFill>
                   <a:schemeClr val="tx1">
                     <a:lumMod val="75000"/>
@@ -3068,10 +3057,10 @@
                   </a:schemeClr>
                 </a:solidFill>
               </a:rPr>
-              <a:t> and Jaime </a:t>
-            </a:r>
-            <a:r>
-              <a:rPr lang="en-GB" sz="2000" i="1" dirty="0" err="1" smtClean="0">
+              <a:t>íguez</a:t>
+            </a:r>
+            <a:r>
+              <a:rPr lang="es-ES" sz="2000" i="1" dirty="0" smtClean="0">
                 <a:solidFill>
                   <a:schemeClr val="tx1">
                     <a:lumMod val="75000"/>
@@ -3079,10 +3068,10 @@
                   </a:schemeClr>
                 </a:solidFill>
               </a:rPr>
-              <a:t>Rodr</a:t>
-            </a:r>
-            <a:r>
-              <a:rPr lang="es-ES" sz="2000" i="1" dirty="0" err="1" smtClean="0">
+              <a:t> </a:t>
+            </a:r>
+            <a:r>
+              <a:rPr lang="es-ES" sz="2000" i="1" dirty="0" smtClean="0">
                 <a:solidFill>
                   <a:schemeClr val="tx1">
                     <a:lumMod val="75000"/>
@@ -3090,10 +3079,10 @@
                   </a:schemeClr>
                 </a:solidFill>
               </a:rPr>
-              <a:t>íguez</a:t>
-            </a:r>
-            <a:r>
-              <a:rPr lang="es-ES" sz="2000" i="1" dirty="0" smtClean="0">
+              <a:t>Guerra, </a:t>
+            </a:r>
+            <a:r>
+              <a:rPr lang="en-GB" sz="2000" i="1" dirty="0">
                 <a:solidFill>
                   <a:schemeClr val="tx1">
                     <a:lumMod val="75000"/>
@@ -3101,7 +3090,29 @@
                   </a:schemeClr>
                 </a:solidFill>
               </a:rPr>
-              <a:t> Guerra</a:t>
+              <a:t>Jean-Didier </a:t>
+            </a:r>
+            <a:r>
+              <a:rPr lang="en-GB" sz="2000" i="1" dirty="0" err="1">
+                <a:solidFill>
+                  <a:schemeClr val="tx1">
+                    <a:lumMod val="75000"/>
+                    <a:lumOff val="25000"/>
+                  </a:schemeClr>
+                </a:solidFill>
+              </a:rPr>
+              <a:t>Maréchal</a:t>
+            </a:r>
+            <a:r>
+              <a:rPr lang="en-GB" sz="2000" i="1" dirty="0">
+                <a:solidFill>
+                  <a:schemeClr val="tx1">
+                    <a:lumMod val="75000"/>
+                    <a:lumOff val="25000"/>
+                  </a:schemeClr>
+                </a:solidFill>
+              </a:rPr>
+              <a:t> </a:t>
             </a:r>
             <a:endParaRPr lang="en-GB" sz="2000" i="1" dirty="0" smtClean="0">
               <a:solidFill>
@@ -3117,7 +3128,7 @@
               <a:buNone/>
             </a:pPr>
             <a:r>
-              <a:rPr lang="en-GB" sz="1500" i="1" dirty="0" smtClean="0">
+              <a:rPr lang="en-GB" sz="1500" i="1" dirty="0" err="1" smtClean="0">
                 <a:solidFill>
                   <a:schemeClr val="tx1">
                     <a:lumMod val="75000"/>
@@ -3125,8 +3136,16 @@
                   </a:schemeClr>
                 </a:solidFill>
               </a:rPr>
-              <a:t>The Biotechnological Computational Chemistry Team</a:t>
-            </a:r>
+              <a:t>Insilichem.bio</a:t>
+            </a:r>
+            <a:endParaRPr lang="en-GB" sz="1500" i="1" dirty="0" smtClean="0">
+              <a:solidFill>
+                <a:schemeClr val="tx1">
+                  <a:lumMod val="75000"/>
+                  <a:lumOff val="25000"/>
+                </a:schemeClr>
+              </a:solidFill>
+            </a:endParaRPr>
           </a:p>
           <a:p>
             <a:pPr marL="0" indent="0" algn="ctr">
@@ -3392,15 +3411,7 @@
                   <a:schemeClr val="bg1"/>
                 </a:solidFill>
               </a:rPr>
-              <a:t>Module </a:t>
-            </a:r>
-            <a:r>
-              <a:rPr lang="en-GB" sz="2400" dirty="0" smtClean="0">
-                <a:solidFill>
-                  <a:schemeClr val="bg1"/>
-                </a:solidFill>
-              </a:rPr>
-              <a:t>4</a:t>
+              <a:t>Module 4</a:t>
             </a:r>
             <a:endParaRPr lang="en-GB" sz="2400" dirty="0">
               <a:solidFill>
@@ -3519,1019 +3530,6 @@
       </p:par>
     </p:tnLst>
   </p:timing>
-</p:sld>
-</file>
-
-<file path=ppt/slides/slide10.xml><?xml version="1.0" encoding="utf-8"?>
-<p:sld xmlns:a="http://schemas.openxmlformats.org/drawingml/2006/main" xmlns:r="http://schemas.openxmlformats.org/officeDocument/2006/relationships" xmlns:p="http://schemas.openxmlformats.org/presentationml/2006/main">
-  <p:cSld>
-    <p:spTree>
-      <p:nvGrpSpPr>
-        <p:cNvPr id="1" name=""/>
-        <p:cNvGrpSpPr/>
-        <p:nvPr/>
-      </p:nvGrpSpPr>
-      <p:grpSpPr>
-        <a:xfrm>
-          <a:off x="0" y="0"/>
-          <a:ext cx="0" cy="0"/>
-          <a:chOff x="0" y="0"/>
-          <a:chExt cx="0" cy="0"/>
-        </a:xfrm>
-      </p:grpSpPr>
-      <p:sp>
-        <p:nvSpPr>
-          <p:cNvPr id="2" name="Title 1"/>
-          <p:cNvSpPr>
-            <a:spLocks noGrp="1"/>
-          </p:cNvSpPr>
-          <p:nvPr>
-            <p:ph type="title"/>
-          </p:nvPr>
-        </p:nvSpPr>
-        <p:spPr/>
-        <p:txBody>
-          <a:bodyPr/>
-          <a:lstStyle/>
-          <a:p>
-            <a:r>
-              <a:rPr lang="en-US" dirty="0" smtClean="0"/>
-              <a:t>Structural </a:t>
-            </a:r>
-            <a:r>
-              <a:rPr lang="en-US" dirty="0" err="1" smtClean="0"/>
-              <a:t>objets</a:t>
-            </a:r>
-            <a:r>
-              <a:rPr lang="en-US" dirty="0" smtClean="0"/>
-              <a:t> in chimera</a:t>
-            </a:r>
-            <a:endParaRPr lang="en-US" dirty="0"/>
-          </a:p>
-        </p:txBody>
-      </p:sp>
-      <p:sp>
-        <p:nvSpPr>
-          <p:cNvPr id="3" name="Content Placeholder 2"/>
-          <p:cNvSpPr>
-            <a:spLocks noGrp="1"/>
-          </p:cNvSpPr>
-          <p:nvPr>
-            <p:ph idx="1"/>
-          </p:nvPr>
-        </p:nvSpPr>
-        <p:spPr/>
-        <p:txBody>
-          <a:bodyPr/>
-          <a:lstStyle/>
-          <a:p>
-            <a:r>
-              <a:rPr lang="en-US" dirty="0" smtClean="0"/>
-              <a:t>Model</a:t>
-            </a:r>
-          </a:p>
-          <a:p>
-            <a:r>
-              <a:rPr lang="en-US" dirty="0" smtClean="0"/>
-              <a:t>Atoms</a:t>
-            </a:r>
-          </a:p>
-          <a:p>
-            <a:r>
-              <a:rPr lang="en-US" dirty="0" smtClean="0"/>
-              <a:t>Residues</a:t>
-            </a:r>
-          </a:p>
-          <a:p>
-            <a:r>
-              <a:rPr lang="en-US" dirty="0" smtClean="0"/>
-              <a:t>Bonds</a:t>
-            </a:r>
-          </a:p>
-          <a:p>
-            <a:endParaRPr lang="en-US" dirty="0"/>
-          </a:p>
-        </p:txBody>
-      </p:sp>
-      <p:sp>
-        <p:nvSpPr>
-          <p:cNvPr id="4" name="Slide Number Placeholder 3"/>
-          <p:cNvSpPr>
-            <a:spLocks noGrp="1"/>
-          </p:cNvSpPr>
-          <p:nvPr>
-            <p:ph type="sldNum" sz="quarter" idx="12"/>
-          </p:nvPr>
-        </p:nvSpPr>
-        <p:spPr/>
-        <p:txBody>
-          <a:bodyPr/>
-          <a:lstStyle/>
-          <a:p>
-            <a:fld id="{9F2F5E10-5301-4EE6-90D2-A6C4A3F62BED}" type="slidenum">
-              <a:rPr lang="en-US" smtClean="0"/>
-              <a:pPr/>
-              <a:t>10</a:t>
-            </a:fld>
-            <a:endParaRPr lang="en-US" dirty="0"/>
-          </a:p>
-        </p:txBody>
-      </p:sp>
-    </p:spTree>
-    <p:extLst>
-      <p:ext uri="{BB962C8B-B14F-4D97-AF65-F5344CB8AC3E}">
-        <p14:creationId xmlns:p14="http://schemas.microsoft.com/office/powerpoint/2010/main" val="1526218690"/>
-      </p:ext>
-    </p:extLst>
-  </p:cSld>
-  <p:clrMapOvr>
-    <a:masterClrMapping/>
-  </p:clrMapOvr>
-</p:sld>
-</file>
-
-<file path=ppt/slides/slide11.xml><?xml version="1.0" encoding="utf-8"?>
-<p:sld xmlns:a="http://schemas.openxmlformats.org/drawingml/2006/main" xmlns:r="http://schemas.openxmlformats.org/officeDocument/2006/relationships" xmlns:p="http://schemas.openxmlformats.org/presentationml/2006/main">
-  <p:cSld>
-    <p:spTree>
-      <p:nvGrpSpPr>
-        <p:cNvPr id="1" name=""/>
-        <p:cNvGrpSpPr/>
-        <p:nvPr/>
-      </p:nvGrpSpPr>
-      <p:grpSpPr>
-        <a:xfrm>
-          <a:off x="0" y="0"/>
-          <a:ext cx="0" cy="0"/>
-          <a:chOff x="0" y="0"/>
-          <a:chExt cx="0" cy="0"/>
-        </a:xfrm>
-      </p:grpSpPr>
-      <p:sp>
-        <p:nvSpPr>
-          <p:cNvPr id="2" name="Title 1"/>
-          <p:cNvSpPr>
-            <a:spLocks noGrp="1"/>
-          </p:cNvSpPr>
-          <p:nvPr>
-            <p:ph type="title"/>
-          </p:nvPr>
-        </p:nvSpPr>
-        <p:spPr/>
-        <p:txBody>
-          <a:bodyPr/>
-          <a:lstStyle/>
-          <a:p>
-            <a:r>
-              <a:rPr lang="en-US" dirty="0" smtClean="0"/>
-              <a:t>My first structural scripts</a:t>
-            </a:r>
-            <a:endParaRPr lang="en-US" dirty="0"/>
-          </a:p>
-        </p:txBody>
-      </p:sp>
-      <p:sp>
-        <p:nvSpPr>
-          <p:cNvPr id="3" name="Content Placeholder 2"/>
-          <p:cNvSpPr>
-            <a:spLocks noGrp="1"/>
-          </p:cNvSpPr>
-          <p:nvPr>
-            <p:ph idx="1"/>
-          </p:nvPr>
-        </p:nvSpPr>
-        <p:spPr/>
-        <p:txBody>
-          <a:bodyPr/>
-          <a:lstStyle/>
-          <a:p>
-            <a:r>
-              <a:rPr lang="en-US" dirty="0" smtClean="0"/>
-              <a:t>1. Reaching modes</a:t>
-            </a:r>
-          </a:p>
-          <a:p>
-            <a:endParaRPr lang="en-US" dirty="0"/>
-          </a:p>
-          <a:p>
-            <a:r>
-              <a:rPr lang="en-US" dirty="0" smtClean="0"/>
-              <a:t>2. Reaching selections</a:t>
-            </a:r>
-          </a:p>
-          <a:p>
-            <a:endParaRPr lang="en-US" dirty="0"/>
-          </a:p>
-          <a:p>
-            <a:r>
-              <a:rPr lang="en-US" dirty="0" smtClean="0"/>
-              <a:t>Atoms</a:t>
-            </a:r>
-          </a:p>
-          <a:p>
-            <a:r>
-              <a:rPr lang="en-US" dirty="0" smtClean="0"/>
-              <a:t>Residues</a:t>
-            </a:r>
-          </a:p>
-          <a:p>
-            <a:endParaRPr lang="en-US" dirty="0"/>
-          </a:p>
-        </p:txBody>
-      </p:sp>
-      <p:sp>
-        <p:nvSpPr>
-          <p:cNvPr id="4" name="Slide Number Placeholder 3"/>
-          <p:cNvSpPr>
-            <a:spLocks noGrp="1"/>
-          </p:cNvSpPr>
-          <p:nvPr>
-            <p:ph type="sldNum" sz="quarter" idx="12"/>
-          </p:nvPr>
-        </p:nvSpPr>
-        <p:spPr/>
-        <p:txBody>
-          <a:bodyPr/>
-          <a:lstStyle/>
-          <a:p>
-            <a:fld id="{9F2F5E10-5301-4EE6-90D2-A6C4A3F62BED}" type="slidenum">
-              <a:rPr lang="en-US" smtClean="0"/>
-              <a:pPr/>
-              <a:t>11</a:t>
-            </a:fld>
-            <a:endParaRPr lang="en-US" dirty="0"/>
-          </a:p>
-        </p:txBody>
-      </p:sp>
-    </p:spTree>
-    <p:extLst>
-      <p:ext uri="{BB962C8B-B14F-4D97-AF65-F5344CB8AC3E}">
-        <p14:creationId xmlns:p14="http://schemas.microsoft.com/office/powerpoint/2010/main" val="400689128"/>
-      </p:ext>
-    </p:extLst>
-  </p:cSld>
-  <p:clrMapOvr>
-    <a:masterClrMapping/>
-  </p:clrMapOvr>
-</p:sld>
-</file>
-
-<file path=ppt/slides/slide12.xml><?xml version="1.0" encoding="utf-8"?>
-<p:sld xmlns:a="http://schemas.openxmlformats.org/drawingml/2006/main" xmlns:r="http://schemas.openxmlformats.org/officeDocument/2006/relationships" xmlns:p="http://schemas.openxmlformats.org/presentationml/2006/main">
-  <p:cSld>
-    <p:spTree>
-      <p:nvGrpSpPr>
-        <p:cNvPr id="1" name=""/>
-        <p:cNvGrpSpPr/>
-        <p:nvPr/>
-      </p:nvGrpSpPr>
-      <p:grpSpPr>
-        <a:xfrm>
-          <a:off x="0" y="0"/>
-          <a:ext cx="0" cy="0"/>
-          <a:chOff x="0" y="0"/>
-          <a:chExt cx="0" cy="0"/>
-        </a:xfrm>
-      </p:grpSpPr>
-      <p:sp>
-        <p:nvSpPr>
-          <p:cNvPr id="2" name="Title 1"/>
-          <p:cNvSpPr>
-            <a:spLocks noGrp="1"/>
-          </p:cNvSpPr>
-          <p:nvPr>
-            <p:ph type="title"/>
-          </p:nvPr>
-        </p:nvSpPr>
-        <p:spPr/>
-        <p:txBody>
-          <a:bodyPr>
-            <a:normAutofit/>
-          </a:bodyPr>
-          <a:lstStyle/>
-          <a:p>
-            <a:r>
-              <a:rPr lang="en-US" dirty="0" smtClean="0"/>
-              <a:t>command line and scripting</a:t>
-            </a:r>
-            <a:endParaRPr lang="en-US" dirty="0"/>
-          </a:p>
-        </p:txBody>
-      </p:sp>
-      <p:sp>
-        <p:nvSpPr>
-          <p:cNvPr id="3" name="Content Placeholder 2"/>
-          <p:cNvSpPr>
-            <a:spLocks noGrp="1"/>
-          </p:cNvSpPr>
-          <p:nvPr>
-            <p:ph idx="1"/>
-          </p:nvPr>
-        </p:nvSpPr>
-        <p:spPr/>
-        <p:txBody>
-          <a:bodyPr/>
-          <a:lstStyle/>
-          <a:p>
-            <a:r>
-              <a:rPr lang="en-US" dirty="0" smtClean="0"/>
-              <a:t>How to use command lines:</a:t>
-            </a:r>
-          </a:p>
-          <a:p>
-            <a:endParaRPr lang="en-US" dirty="0"/>
-          </a:p>
-          <a:p>
-            <a:endParaRPr lang="en-US" dirty="0" smtClean="0"/>
-          </a:p>
-          <a:p>
-            <a:endParaRPr lang="en-US" dirty="0"/>
-          </a:p>
-          <a:p>
-            <a:r>
-              <a:rPr lang="en-US" dirty="0" smtClean="0"/>
-              <a:t>Examples</a:t>
-            </a:r>
-            <a:endParaRPr lang="en-US" dirty="0"/>
-          </a:p>
-        </p:txBody>
-      </p:sp>
-      <p:sp>
-        <p:nvSpPr>
-          <p:cNvPr id="4" name="Slide Number Placeholder 3"/>
-          <p:cNvSpPr>
-            <a:spLocks noGrp="1"/>
-          </p:cNvSpPr>
-          <p:nvPr>
-            <p:ph type="sldNum" sz="quarter" idx="12"/>
-          </p:nvPr>
-        </p:nvSpPr>
-        <p:spPr/>
-        <p:txBody>
-          <a:bodyPr/>
-          <a:lstStyle/>
-          <a:p>
-            <a:fld id="{9F2F5E10-5301-4EE6-90D2-A6C4A3F62BED}" type="slidenum">
-              <a:rPr lang="en-US" smtClean="0"/>
-              <a:pPr/>
-              <a:t>12</a:t>
-            </a:fld>
-            <a:endParaRPr lang="en-US" dirty="0"/>
-          </a:p>
-        </p:txBody>
-      </p:sp>
-    </p:spTree>
-    <p:extLst>
-      <p:ext uri="{BB962C8B-B14F-4D97-AF65-F5344CB8AC3E}">
-        <p14:creationId xmlns:p14="http://schemas.microsoft.com/office/powerpoint/2010/main" val="578425333"/>
-      </p:ext>
-    </p:extLst>
-  </p:cSld>
-  <p:clrMapOvr>
-    <a:masterClrMapping/>
-  </p:clrMapOvr>
-</p:sld>
-</file>
-
-<file path=ppt/slides/slide13.xml><?xml version="1.0" encoding="utf-8"?>
-<p:sld xmlns:a="http://schemas.openxmlformats.org/drawingml/2006/main" xmlns:r="http://schemas.openxmlformats.org/officeDocument/2006/relationships" xmlns:p="http://schemas.openxmlformats.org/presentationml/2006/main">
-  <p:cSld>
-    <p:spTree>
-      <p:nvGrpSpPr>
-        <p:cNvPr id="1" name=""/>
-        <p:cNvGrpSpPr/>
-        <p:nvPr/>
-      </p:nvGrpSpPr>
-      <p:grpSpPr>
-        <a:xfrm>
-          <a:off x="0" y="0"/>
-          <a:ext cx="0" cy="0"/>
-          <a:chOff x="0" y="0"/>
-          <a:chExt cx="0" cy="0"/>
-        </a:xfrm>
-      </p:grpSpPr>
-      <p:sp>
-        <p:nvSpPr>
-          <p:cNvPr id="2" name="Title 1"/>
-          <p:cNvSpPr>
-            <a:spLocks noGrp="1"/>
-          </p:cNvSpPr>
-          <p:nvPr>
-            <p:ph type="title"/>
-          </p:nvPr>
-        </p:nvSpPr>
-        <p:spPr/>
-        <p:txBody>
-          <a:bodyPr>
-            <a:normAutofit fontScale="90000"/>
-          </a:bodyPr>
-          <a:lstStyle/>
-          <a:p>
-            <a:r>
-              <a:rPr lang="en-US" dirty="0" smtClean="0"/>
-              <a:t>Bridging command line and scripting</a:t>
-            </a:r>
-            <a:endParaRPr lang="en-US" dirty="0"/>
-          </a:p>
-        </p:txBody>
-      </p:sp>
-      <p:sp>
-        <p:nvSpPr>
-          <p:cNvPr id="3" name="Content Placeholder 2"/>
-          <p:cNvSpPr>
-            <a:spLocks noGrp="1"/>
-          </p:cNvSpPr>
-          <p:nvPr>
-            <p:ph idx="1"/>
-          </p:nvPr>
-        </p:nvSpPr>
-        <p:spPr/>
-        <p:txBody>
-          <a:bodyPr/>
-          <a:lstStyle/>
-          <a:p>
-            <a:r>
-              <a:rPr lang="en-US" dirty="0" smtClean="0"/>
-              <a:t>Embedding a command line in a python run is performed using:</a:t>
-            </a:r>
-          </a:p>
-          <a:p>
-            <a:endParaRPr lang="en-US" dirty="0" smtClean="0"/>
-          </a:p>
-        </p:txBody>
-      </p:sp>
-      <p:sp>
-        <p:nvSpPr>
-          <p:cNvPr id="4" name="Slide Number Placeholder 3"/>
-          <p:cNvSpPr>
-            <a:spLocks noGrp="1"/>
-          </p:cNvSpPr>
-          <p:nvPr>
-            <p:ph type="sldNum" sz="quarter" idx="12"/>
-          </p:nvPr>
-        </p:nvSpPr>
-        <p:spPr/>
-        <p:txBody>
-          <a:bodyPr/>
-          <a:lstStyle/>
-          <a:p>
-            <a:fld id="{9F2F5E10-5301-4EE6-90D2-A6C4A3F62BED}" type="slidenum">
-              <a:rPr lang="en-US" smtClean="0"/>
-              <a:pPr/>
-              <a:t>13</a:t>
-            </a:fld>
-            <a:endParaRPr lang="en-US" dirty="0"/>
-          </a:p>
-        </p:txBody>
-      </p:sp>
-    </p:spTree>
-    <p:extLst>
-      <p:ext uri="{BB962C8B-B14F-4D97-AF65-F5344CB8AC3E}">
-        <p14:creationId xmlns:p14="http://schemas.microsoft.com/office/powerpoint/2010/main" val="597533859"/>
-      </p:ext>
-    </p:extLst>
-  </p:cSld>
-  <p:clrMapOvr>
-    <a:masterClrMapping/>
-  </p:clrMapOvr>
-</p:sld>
-</file>
-
-<file path=ppt/slides/slide14.xml><?xml version="1.0" encoding="utf-8"?>
-<p:sld xmlns:a="http://schemas.openxmlformats.org/drawingml/2006/main" xmlns:r="http://schemas.openxmlformats.org/officeDocument/2006/relationships" xmlns:p="http://schemas.openxmlformats.org/presentationml/2006/main">
-  <p:cSld>
-    <p:spTree>
-      <p:nvGrpSpPr>
-        <p:cNvPr id="1" name=""/>
-        <p:cNvGrpSpPr/>
-        <p:nvPr/>
-      </p:nvGrpSpPr>
-      <p:grpSpPr>
-        <a:xfrm>
-          <a:off x="0" y="0"/>
-          <a:ext cx="0" cy="0"/>
-          <a:chOff x="0" y="0"/>
-          <a:chExt cx="0" cy="0"/>
-        </a:xfrm>
-      </p:grpSpPr>
-      <p:sp>
-        <p:nvSpPr>
-          <p:cNvPr id="2" name="Title 1"/>
-          <p:cNvSpPr>
-            <a:spLocks noGrp="1"/>
-          </p:cNvSpPr>
-          <p:nvPr>
-            <p:ph type="title"/>
-          </p:nvPr>
-        </p:nvSpPr>
-        <p:spPr/>
-        <p:txBody>
-          <a:bodyPr>
-            <a:normAutofit/>
-          </a:bodyPr>
-          <a:lstStyle/>
-          <a:p>
-            <a:r>
-              <a:rPr lang="en-US" dirty="0" smtClean="0"/>
-              <a:t>Script 1</a:t>
-            </a:r>
-            <a:endParaRPr lang="en-US" dirty="0"/>
-          </a:p>
-        </p:txBody>
-      </p:sp>
-      <p:sp>
-        <p:nvSpPr>
-          <p:cNvPr id="3" name="Content Placeholder 2"/>
-          <p:cNvSpPr>
-            <a:spLocks noGrp="1"/>
-          </p:cNvSpPr>
-          <p:nvPr>
-            <p:ph idx="1"/>
-          </p:nvPr>
-        </p:nvSpPr>
-        <p:spPr/>
-        <p:txBody>
-          <a:bodyPr/>
-          <a:lstStyle/>
-          <a:p>
-            <a:r>
-              <a:rPr lang="en-US" dirty="0"/>
-              <a:t>Printing the sequence of amino </a:t>
-            </a:r>
-            <a:r>
-              <a:rPr lang="en-US" dirty="0" smtClean="0"/>
-              <a:t>acids</a:t>
-            </a:r>
-          </a:p>
-          <a:p>
-            <a:endParaRPr lang="en-US" dirty="0"/>
-          </a:p>
-          <a:p>
-            <a:endParaRPr lang="en-US" dirty="0"/>
-          </a:p>
-        </p:txBody>
-      </p:sp>
-      <p:sp>
-        <p:nvSpPr>
-          <p:cNvPr id="4" name="Slide Number Placeholder 3"/>
-          <p:cNvSpPr>
-            <a:spLocks noGrp="1"/>
-          </p:cNvSpPr>
-          <p:nvPr>
-            <p:ph type="sldNum" sz="quarter" idx="12"/>
-          </p:nvPr>
-        </p:nvSpPr>
-        <p:spPr/>
-        <p:txBody>
-          <a:bodyPr/>
-          <a:lstStyle/>
-          <a:p>
-            <a:fld id="{9F2F5E10-5301-4EE6-90D2-A6C4A3F62BED}" type="slidenum">
-              <a:rPr lang="en-US" smtClean="0"/>
-              <a:pPr/>
-              <a:t>14</a:t>
-            </a:fld>
-            <a:endParaRPr lang="en-US" dirty="0"/>
-          </a:p>
-        </p:txBody>
-      </p:sp>
-    </p:spTree>
-    <p:extLst>
-      <p:ext uri="{BB962C8B-B14F-4D97-AF65-F5344CB8AC3E}">
-        <p14:creationId xmlns:p14="http://schemas.microsoft.com/office/powerpoint/2010/main" val="88679215"/>
-      </p:ext>
-    </p:extLst>
-  </p:cSld>
-  <p:clrMapOvr>
-    <a:masterClrMapping/>
-  </p:clrMapOvr>
-</p:sld>
-</file>
-
-<file path=ppt/slides/slide15.xml><?xml version="1.0" encoding="utf-8"?>
-<p:sld xmlns:a="http://schemas.openxmlformats.org/drawingml/2006/main" xmlns:r="http://schemas.openxmlformats.org/officeDocument/2006/relationships" xmlns:p="http://schemas.openxmlformats.org/presentationml/2006/main">
-  <p:cSld>
-    <p:spTree>
-      <p:nvGrpSpPr>
-        <p:cNvPr id="1" name=""/>
-        <p:cNvGrpSpPr/>
-        <p:nvPr/>
-      </p:nvGrpSpPr>
-      <p:grpSpPr>
-        <a:xfrm>
-          <a:off x="0" y="0"/>
-          <a:ext cx="0" cy="0"/>
-          <a:chOff x="0" y="0"/>
-          <a:chExt cx="0" cy="0"/>
-        </a:xfrm>
-      </p:grpSpPr>
-      <p:sp>
-        <p:nvSpPr>
-          <p:cNvPr id="2" name="Title 1"/>
-          <p:cNvSpPr>
-            <a:spLocks noGrp="1"/>
-          </p:cNvSpPr>
-          <p:nvPr>
-            <p:ph type="title"/>
-          </p:nvPr>
-        </p:nvSpPr>
-        <p:spPr/>
-        <p:txBody>
-          <a:bodyPr>
-            <a:normAutofit fontScale="90000"/>
-          </a:bodyPr>
-          <a:lstStyle/>
-          <a:p>
-            <a:r>
-              <a:rPr lang="en-US" dirty="0" smtClean="0"/>
-              <a:t>Script 2</a:t>
-            </a:r>
-            <a:br>
-              <a:rPr lang="en-US" dirty="0" smtClean="0"/>
-            </a:br>
-            <a:endParaRPr lang="en-US" dirty="0"/>
-          </a:p>
-        </p:txBody>
-      </p:sp>
-      <p:sp>
-        <p:nvSpPr>
-          <p:cNvPr id="3" name="Content Placeholder 2"/>
-          <p:cNvSpPr>
-            <a:spLocks noGrp="1"/>
-          </p:cNvSpPr>
-          <p:nvPr>
-            <p:ph idx="1"/>
-          </p:nvPr>
-        </p:nvSpPr>
-        <p:spPr/>
-        <p:txBody>
-          <a:bodyPr/>
-          <a:lstStyle/>
-          <a:p>
-            <a:r>
-              <a:rPr lang="en-US" dirty="0" smtClean="0"/>
-              <a:t>Show and display with a different color residues in a binding site pocket</a:t>
-            </a:r>
-            <a:endParaRPr lang="en-US" dirty="0"/>
-          </a:p>
-        </p:txBody>
-      </p:sp>
-      <p:sp>
-        <p:nvSpPr>
-          <p:cNvPr id="4" name="Slide Number Placeholder 3"/>
-          <p:cNvSpPr>
-            <a:spLocks noGrp="1"/>
-          </p:cNvSpPr>
-          <p:nvPr>
-            <p:ph type="sldNum" sz="quarter" idx="12"/>
-          </p:nvPr>
-        </p:nvSpPr>
-        <p:spPr/>
-        <p:txBody>
-          <a:bodyPr/>
-          <a:lstStyle/>
-          <a:p>
-            <a:fld id="{9F2F5E10-5301-4EE6-90D2-A6C4A3F62BED}" type="slidenum">
-              <a:rPr lang="en-US" smtClean="0"/>
-              <a:pPr/>
-              <a:t>15</a:t>
-            </a:fld>
-            <a:endParaRPr lang="en-US" dirty="0"/>
-          </a:p>
-        </p:txBody>
-      </p:sp>
-    </p:spTree>
-    <p:extLst>
-      <p:ext uri="{BB962C8B-B14F-4D97-AF65-F5344CB8AC3E}">
-        <p14:creationId xmlns:p14="http://schemas.microsoft.com/office/powerpoint/2010/main" val="1133234305"/>
-      </p:ext>
-    </p:extLst>
-  </p:cSld>
-  <p:clrMapOvr>
-    <a:masterClrMapping/>
-  </p:clrMapOvr>
-</p:sld>
-</file>
-
-<file path=ppt/slides/slide16.xml><?xml version="1.0" encoding="utf-8"?>
-<p:sld xmlns:a="http://schemas.openxmlformats.org/drawingml/2006/main" xmlns:r="http://schemas.openxmlformats.org/officeDocument/2006/relationships" xmlns:p="http://schemas.openxmlformats.org/presentationml/2006/main">
-  <p:cSld>
-    <p:spTree>
-      <p:nvGrpSpPr>
-        <p:cNvPr id="1" name=""/>
-        <p:cNvGrpSpPr/>
-        <p:nvPr/>
-      </p:nvGrpSpPr>
-      <p:grpSpPr>
-        <a:xfrm>
-          <a:off x="0" y="0"/>
-          <a:ext cx="0" cy="0"/>
-          <a:chOff x="0" y="0"/>
-          <a:chExt cx="0" cy="0"/>
-        </a:xfrm>
-      </p:grpSpPr>
-      <p:sp>
-        <p:nvSpPr>
-          <p:cNvPr id="2" name="Title 1"/>
-          <p:cNvSpPr>
-            <a:spLocks noGrp="1"/>
-          </p:cNvSpPr>
-          <p:nvPr>
-            <p:ph type="title"/>
-          </p:nvPr>
-        </p:nvSpPr>
-        <p:spPr/>
-        <p:txBody>
-          <a:bodyPr/>
-          <a:lstStyle/>
-          <a:p>
-            <a:r>
-              <a:rPr lang="en-US" dirty="0" smtClean="0"/>
-              <a:t>Script 3</a:t>
-            </a:r>
-            <a:endParaRPr lang="en-US" dirty="0"/>
-          </a:p>
-        </p:txBody>
-      </p:sp>
-      <p:sp>
-        <p:nvSpPr>
-          <p:cNvPr id="3" name="Content Placeholder 2"/>
-          <p:cNvSpPr>
-            <a:spLocks noGrp="1"/>
-          </p:cNvSpPr>
-          <p:nvPr>
-            <p:ph idx="1"/>
-          </p:nvPr>
-        </p:nvSpPr>
-        <p:spPr/>
-        <p:txBody>
-          <a:bodyPr/>
-          <a:lstStyle/>
-          <a:p>
-            <a:r>
-              <a:rPr lang="en-US" dirty="0" smtClean="0"/>
-              <a:t>Printing the list of serial numbers of a selection</a:t>
-            </a:r>
-          </a:p>
-          <a:p>
-            <a:endParaRPr lang="en-US" dirty="0"/>
-          </a:p>
-          <a:p>
-            <a:endParaRPr lang="en-US" dirty="0" smtClean="0"/>
-          </a:p>
-          <a:p>
-            <a:r>
-              <a:rPr lang="en-US" dirty="0" smtClean="0"/>
-              <a:t>Print list of only polar residues</a:t>
-            </a:r>
-            <a:endParaRPr lang="en-US" dirty="0"/>
-          </a:p>
-        </p:txBody>
-      </p:sp>
-      <p:sp>
-        <p:nvSpPr>
-          <p:cNvPr id="4" name="Slide Number Placeholder 3"/>
-          <p:cNvSpPr>
-            <a:spLocks noGrp="1"/>
-          </p:cNvSpPr>
-          <p:nvPr>
-            <p:ph type="sldNum" sz="quarter" idx="12"/>
-          </p:nvPr>
-        </p:nvSpPr>
-        <p:spPr/>
-        <p:txBody>
-          <a:bodyPr/>
-          <a:lstStyle/>
-          <a:p>
-            <a:fld id="{9F2F5E10-5301-4EE6-90D2-A6C4A3F62BED}" type="slidenum">
-              <a:rPr lang="en-US" smtClean="0"/>
-              <a:pPr/>
-              <a:t>16</a:t>
-            </a:fld>
-            <a:endParaRPr lang="en-US" dirty="0"/>
-          </a:p>
-        </p:txBody>
-      </p:sp>
-    </p:spTree>
-    <p:extLst>
-      <p:ext uri="{BB962C8B-B14F-4D97-AF65-F5344CB8AC3E}">
-        <p14:creationId xmlns:p14="http://schemas.microsoft.com/office/powerpoint/2010/main" val="1387212063"/>
-      </p:ext>
-    </p:extLst>
-  </p:cSld>
-  <p:clrMapOvr>
-    <a:masterClrMapping/>
-  </p:clrMapOvr>
-</p:sld>
-</file>
-
-<file path=ppt/slides/slide17.xml><?xml version="1.0" encoding="utf-8"?>
-<p:sld xmlns:a="http://schemas.openxmlformats.org/drawingml/2006/main" xmlns:r="http://schemas.openxmlformats.org/officeDocument/2006/relationships" xmlns:p="http://schemas.openxmlformats.org/presentationml/2006/main">
-  <p:cSld>
-    <p:spTree>
-      <p:nvGrpSpPr>
-        <p:cNvPr id="1" name=""/>
-        <p:cNvGrpSpPr/>
-        <p:nvPr/>
-      </p:nvGrpSpPr>
-      <p:grpSpPr>
-        <a:xfrm>
-          <a:off x="0" y="0"/>
-          <a:ext cx="0" cy="0"/>
-          <a:chOff x="0" y="0"/>
-          <a:chExt cx="0" cy="0"/>
-        </a:xfrm>
-      </p:grpSpPr>
-      <p:sp>
-        <p:nvSpPr>
-          <p:cNvPr id="2" name="Title 1"/>
-          <p:cNvSpPr>
-            <a:spLocks noGrp="1"/>
-          </p:cNvSpPr>
-          <p:nvPr>
-            <p:ph type="title"/>
-          </p:nvPr>
-        </p:nvSpPr>
-        <p:spPr/>
-        <p:txBody>
-          <a:bodyPr/>
-          <a:lstStyle/>
-          <a:p>
-            <a:r>
-              <a:rPr lang="en-US" dirty="0" smtClean="0"/>
-              <a:t>Script 4: </a:t>
-            </a:r>
-            <a:r>
-              <a:rPr lang="en-US" dirty="0" err="1" smtClean="0"/>
-              <a:t>oneliners</a:t>
-            </a:r>
-            <a:endParaRPr lang="en-US" dirty="0"/>
-          </a:p>
-        </p:txBody>
-      </p:sp>
-      <p:sp>
-        <p:nvSpPr>
-          <p:cNvPr id="3" name="Content Placeholder 2"/>
-          <p:cNvSpPr>
-            <a:spLocks noGrp="1"/>
-          </p:cNvSpPr>
-          <p:nvPr>
-            <p:ph idx="1"/>
-          </p:nvPr>
-        </p:nvSpPr>
-        <p:spPr/>
-        <p:txBody>
-          <a:bodyPr/>
-          <a:lstStyle/>
-          <a:p>
-            <a:endParaRPr lang="en-US"/>
-          </a:p>
-        </p:txBody>
-      </p:sp>
-      <p:sp>
-        <p:nvSpPr>
-          <p:cNvPr id="4" name="Slide Number Placeholder 3"/>
-          <p:cNvSpPr>
-            <a:spLocks noGrp="1"/>
-          </p:cNvSpPr>
-          <p:nvPr>
-            <p:ph type="sldNum" sz="quarter" idx="12"/>
-          </p:nvPr>
-        </p:nvSpPr>
-        <p:spPr/>
-        <p:txBody>
-          <a:bodyPr/>
-          <a:lstStyle/>
-          <a:p>
-            <a:fld id="{9F2F5E10-5301-4EE6-90D2-A6C4A3F62BED}" type="slidenum">
-              <a:rPr lang="en-US" smtClean="0"/>
-              <a:pPr/>
-              <a:t>17</a:t>
-            </a:fld>
-            <a:endParaRPr lang="en-US" dirty="0"/>
-          </a:p>
-        </p:txBody>
-      </p:sp>
-    </p:spTree>
-    <p:extLst>
-      <p:ext uri="{BB962C8B-B14F-4D97-AF65-F5344CB8AC3E}">
-        <p14:creationId xmlns:p14="http://schemas.microsoft.com/office/powerpoint/2010/main" val="923594988"/>
-      </p:ext>
-    </p:extLst>
-  </p:cSld>
-  <p:clrMapOvr>
-    <a:masterClrMapping/>
-  </p:clrMapOvr>
-</p:sld>
-</file>
-
-<file path=ppt/slides/slide18.xml><?xml version="1.0" encoding="utf-8"?>
-<p:sld xmlns:a="http://schemas.openxmlformats.org/drawingml/2006/main" xmlns:r="http://schemas.openxmlformats.org/officeDocument/2006/relationships" xmlns:p="http://schemas.openxmlformats.org/presentationml/2006/main">
-  <p:cSld>
-    <p:spTree>
-      <p:nvGrpSpPr>
-        <p:cNvPr id="1" name=""/>
-        <p:cNvGrpSpPr/>
-        <p:nvPr/>
-      </p:nvGrpSpPr>
-      <p:grpSpPr>
-        <a:xfrm>
-          <a:off x="0" y="0"/>
-          <a:ext cx="0" cy="0"/>
-          <a:chOff x="0" y="0"/>
-          <a:chExt cx="0" cy="0"/>
-        </a:xfrm>
-      </p:grpSpPr>
-      <p:sp>
-        <p:nvSpPr>
-          <p:cNvPr id="2" name="Title 1"/>
-          <p:cNvSpPr>
-            <a:spLocks noGrp="1"/>
-          </p:cNvSpPr>
-          <p:nvPr>
-            <p:ph type="title"/>
-          </p:nvPr>
-        </p:nvSpPr>
-        <p:spPr/>
-        <p:txBody>
-          <a:bodyPr>
-            <a:normAutofit fontScale="90000"/>
-          </a:bodyPr>
-          <a:lstStyle/>
-          <a:p>
-            <a:r>
-              <a:rPr lang="en-US" dirty="0" smtClean="0"/>
-              <a:t>Guiding modeling </a:t>
-            </a:r>
-            <a:r>
-              <a:rPr lang="en-US" dirty="0" err="1" smtClean="0"/>
-              <a:t>thoughout</a:t>
-            </a:r>
-            <a:r>
-              <a:rPr lang="en-US" dirty="0" smtClean="0"/>
-              <a:t> python (a small but kind of complex script)</a:t>
-            </a:r>
-            <a:endParaRPr lang="en-US" dirty="0"/>
-          </a:p>
-        </p:txBody>
-      </p:sp>
-      <p:sp>
-        <p:nvSpPr>
-          <p:cNvPr id="3" name="Content Placeholder 2"/>
-          <p:cNvSpPr>
-            <a:spLocks noGrp="1"/>
-          </p:cNvSpPr>
-          <p:nvPr>
-            <p:ph idx="1"/>
-          </p:nvPr>
-        </p:nvSpPr>
-        <p:spPr/>
-        <p:txBody>
-          <a:bodyPr/>
-          <a:lstStyle/>
-          <a:p>
-            <a:r>
-              <a:rPr lang="en-US" dirty="0" err="1" smtClean="0"/>
-              <a:t>rotameros</a:t>
-            </a:r>
-            <a:endParaRPr lang="en-US" dirty="0"/>
-          </a:p>
-        </p:txBody>
-      </p:sp>
-      <p:sp>
-        <p:nvSpPr>
-          <p:cNvPr id="4" name="Slide Number Placeholder 3"/>
-          <p:cNvSpPr>
-            <a:spLocks noGrp="1"/>
-          </p:cNvSpPr>
-          <p:nvPr>
-            <p:ph type="sldNum" sz="quarter" idx="12"/>
-          </p:nvPr>
-        </p:nvSpPr>
-        <p:spPr/>
-        <p:txBody>
-          <a:bodyPr/>
-          <a:lstStyle/>
-          <a:p>
-            <a:fld id="{9F2F5E10-5301-4EE6-90D2-A6C4A3F62BED}" type="slidenum">
-              <a:rPr lang="en-US" smtClean="0"/>
-              <a:pPr/>
-              <a:t>18</a:t>
-            </a:fld>
-            <a:endParaRPr lang="en-US" dirty="0"/>
-          </a:p>
-        </p:txBody>
-      </p:sp>
-    </p:spTree>
-    <p:extLst>
-      <p:ext uri="{BB962C8B-B14F-4D97-AF65-F5344CB8AC3E}">
-        <p14:creationId xmlns:p14="http://schemas.microsoft.com/office/powerpoint/2010/main" val="170711644"/>
-      </p:ext>
-    </p:extLst>
-  </p:cSld>
-  <p:clrMapOvr>
-    <a:masterClrMapping/>
-  </p:clrMapOvr>
 </p:sld>
 </file>
 
@@ -4590,7 +3588,7 @@
         <p:spPr/>
         <p:txBody>
           <a:bodyPr>
-            <a:normAutofit/>
+            <a:normAutofit fontScale="92500"/>
           </a:bodyPr>
           <a:lstStyle/>
           <a:p>
@@ -4601,33 +3599,89 @@
             </a:pPr>
             <a:r>
               <a:rPr lang="en-US" b="1" dirty="0" smtClean="0"/>
-              <a:t>What is python</a:t>
+              <a:t>What is </a:t>
+            </a:r>
+            <a:r>
+              <a:rPr lang="en-US" b="1" dirty="0" smtClean="0"/>
+              <a:t>python?</a:t>
             </a:r>
             <a:endParaRPr lang="en-US" dirty="0" smtClean="0"/>
           </a:p>
           <a:p>
-            <a:pPr lvl="1">
+            <a:pPr>
               <a:lnSpc>
                 <a:spcPct val="90000"/>
               </a:lnSpc>
             </a:pPr>
-            <a:r>
-              <a:rPr lang="en-US" dirty="0" err="1" smtClean="0"/>
-              <a:t>Bla</a:t>
-            </a:r>
-            <a:r>
-              <a:rPr lang="en-US" dirty="0" smtClean="0"/>
-              <a:t> </a:t>
-            </a:r>
-            <a:r>
-              <a:rPr lang="en-US" dirty="0" err="1" smtClean="0"/>
-              <a:t>bla</a:t>
-            </a:r>
-            <a:r>
-              <a:rPr lang="en-US" dirty="0" smtClean="0"/>
-              <a:t> </a:t>
-            </a:r>
-            <a:endParaRPr lang="en-US" dirty="0" smtClean="0"/>
+            <a:endParaRPr lang="en-US" sz="2200" dirty="0"/>
+          </a:p>
+          <a:p>
+            <a:pPr marL="0" indent="0">
+              <a:lnSpc>
+                <a:spcPct val="90000"/>
+              </a:lnSpc>
+              <a:buNone/>
+            </a:pPr>
+            <a:r>
+              <a:rPr lang="en-US" sz="2200" dirty="0" smtClean="0"/>
+              <a:t>Python </a:t>
+            </a:r>
+            <a:r>
+              <a:rPr lang="en-US" sz="2200" dirty="0"/>
+              <a:t>is an interpreted, object-oriented, high-level programming language with dynamic semantics. Its high-level built in data structures, combined with dynamic typing and dynamic binding, make it very attractive for Rapid Application Development, as well as for use as a scripting or glue language to connect existing components together. </a:t>
+            </a:r>
+            <a:endParaRPr lang="en-US" sz="2200" dirty="0" smtClean="0"/>
+          </a:p>
+          <a:p>
+            <a:pPr marL="0" indent="0">
+              <a:lnSpc>
+                <a:spcPct val="90000"/>
+              </a:lnSpc>
+              <a:buNone/>
+            </a:pPr>
+            <a:r>
+              <a:rPr lang="en-US" sz="2200" dirty="0" smtClean="0"/>
+              <a:t>Python's </a:t>
+            </a:r>
+            <a:r>
+              <a:rPr lang="en-US" sz="2200" dirty="0"/>
+              <a:t>simple, easy to learn syntax emphasizes readability and therefore reduces the cost of program maintenance. </a:t>
+            </a:r>
+            <a:endParaRPr lang="en-US" sz="2200" dirty="0" smtClean="0"/>
+          </a:p>
+          <a:p>
+            <a:pPr marL="0" indent="0">
+              <a:lnSpc>
+                <a:spcPct val="90000"/>
+              </a:lnSpc>
+              <a:buNone/>
+            </a:pPr>
+            <a:r>
+              <a:rPr lang="en-US" sz="2200" dirty="0" smtClean="0"/>
+              <a:t>Python </a:t>
+            </a:r>
+            <a:r>
+              <a:rPr lang="en-US" sz="2200" dirty="0"/>
+              <a:t>supports modules and packages, which encourages program modularity and code reuse. </a:t>
+            </a:r>
+            <a:endParaRPr lang="en-US" sz="2200" dirty="0" smtClean="0"/>
+          </a:p>
+          <a:p>
+            <a:pPr marL="0" indent="0">
+              <a:lnSpc>
+                <a:spcPct val="90000"/>
+              </a:lnSpc>
+              <a:buNone/>
+            </a:pPr>
+            <a:r>
+              <a:rPr lang="en-US" sz="2200" dirty="0" smtClean="0"/>
+              <a:t>The </a:t>
+            </a:r>
+            <a:r>
+              <a:rPr lang="en-US" sz="2200" dirty="0"/>
+              <a:t>Python interpreter and the extensive standard library are available in source or binary form without charge for all major platforms, and can be freely distributed.</a:t>
+            </a:r>
+            <a:endParaRPr lang="en-US" sz="2200" dirty="0" smtClean="0"/>
           </a:p>
           <a:p>
             <a:pPr lvl="2">
@@ -4769,10 +3823,43 @@
             </a:r>
           </a:p>
           <a:p>
-            <a:r>
-              <a:rPr lang="en-US" dirty="0"/>
-              <a:t> </a:t>
-            </a:r>
+            <a:pPr lvl="1"/>
+            <a:r>
+              <a:rPr lang="en-US" dirty="0" smtClean="0"/>
+              <a:t>From complex programming to one liner</a:t>
+            </a:r>
+          </a:p>
+          <a:p>
+            <a:pPr lvl="1"/>
+            <a:r>
+              <a:rPr lang="en-US" dirty="0" smtClean="0"/>
+              <a:t>Multiplatform</a:t>
+            </a:r>
+          </a:p>
+          <a:p>
+            <a:pPr lvl="1"/>
+            <a:r>
+              <a:rPr lang="en-US" dirty="0" smtClean="0"/>
+              <a:t>Fast</a:t>
+            </a:r>
+          </a:p>
+          <a:p>
+            <a:pPr lvl="1"/>
+            <a:r>
+              <a:rPr lang="en-US" dirty="0" smtClean="0"/>
+              <a:t>Easy, readable</a:t>
+            </a:r>
+          </a:p>
+          <a:p>
+            <a:pPr lvl="1"/>
+            <a:r>
+              <a:rPr lang="en-US" dirty="0" smtClean="0"/>
+              <a:t>Object = molecular concepts!</a:t>
+            </a:r>
+          </a:p>
+          <a:p>
+            <a:pPr lvl="1"/>
+            <a:endParaRPr lang="en-US" dirty="0"/>
           </a:p>
         </p:txBody>
       </p:sp>
@@ -4849,15 +3936,19 @@
           <a:p>
             <a:r>
               <a:rPr lang="en-US" dirty="0" smtClean="0"/>
-              <a:t>Python embedding in </a:t>
-            </a:r>
-            <a:r>
-              <a:rPr lang="en-US" dirty="0" err="1" smtClean="0"/>
+              <a:t>Python </a:t>
+            </a:r>
+            <a:r>
+              <a:rPr lang="en-US" dirty="0" smtClean="0"/>
+              <a:t>embedded </a:t>
+            </a:r>
+            <a:r>
+              <a:rPr lang="en-US" dirty="0" err="1"/>
               <a:t>Biomolecular</a:t>
             </a:r>
             <a:r>
-              <a:rPr lang="en-US" dirty="0" smtClean="0"/>
-              <a:t> suites</a:t>
+              <a:rPr lang="en-US" dirty="0"/>
+              <a:t> platforms</a:t>
             </a:r>
             <a:endParaRPr lang="en-US" dirty="0"/>
           </a:p>
@@ -4875,10 +3966,69 @@
         </p:nvSpPr>
         <p:spPr/>
         <p:txBody>
-          <a:bodyPr/>
+          <a:bodyPr>
+            <a:normAutofit lnSpcReduction="10000"/>
+          </a:bodyPr>
           <a:lstStyle/>
           <a:p>
-            <a:endParaRPr lang="en-US"/>
+            <a:r>
+              <a:rPr lang="en-US" dirty="0" smtClean="0"/>
+              <a:t>Many suites are built on OR admit python inputs, outputs, analysis, implementation</a:t>
+            </a:r>
+          </a:p>
+          <a:p>
+            <a:pPr lvl="1"/>
+            <a:r>
+              <a:rPr lang="en-US" dirty="0" smtClean="0"/>
+              <a:t>Schrodinger</a:t>
+            </a:r>
+          </a:p>
+          <a:p>
+            <a:pPr lvl="1"/>
+            <a:r>
+              <a:rPr lang="en-US" dirty="0" err="1" smtClean="0"/>
+              <a:t>Pymol</a:t>
+            </a:r>
+            <a:endParaRPr lang="en-US" dirty="0" smtClean="0"/>
+          </a:p>
+          <a:p>
+            <a:pPr lvl="1"/>
+            <a:r>
+              <a:rPr lang="en-US" dirty="0" smtClean="0"/>
+              <a:t>Chimera</a:t>
+            </a:r>
+          </a:p>
+          <a:p>
+            <a:pPr lvl="1"/>
+            <a:r>
+              <a:rPr lang="en-US" dirty="0" smtClean="0"/>
+              <a:t>Etc.</a:t>
+            </a:r>
+          </a:p>
+          <a:p>
+            <a:r>
+              <a:rPr lang="en-US" dirty="0" smtClean="0"/>
+              <a:t>Could be use:</a:t>
+            </a:r>
+          </a:p>
+          <a:p>
+            <a:pPr lvl="1"/>
+            <a:r>
+              <a:rPr lang="en-US" dirty="0"/>
+              <a:t>T</a:t>
+            </a:r>
+            <a:r>
+              <a:rPr lang="en-US" dirty="0" smtClean="0"/>
+              <a:t>o drive computation or for SCULPING</a:t>
+            </a:r>
+          </a:p>
+          <a:p>
+            <a:pPr lvl="1"/>
+            <a:r>
+              <a:rPr lang="en-US" dirty="0" smtClean="0"/>
+              <a:t>For accurate models or fast screening </a:t>
+            </a:r>
+            <a:endParaRPr lang="en-US" dirty="0"/>
           </a:p>
         </p:txBody>
       </p:sp>
@@ -4953,7 +4103,7 @@
           <a:p>
             <a:r>
               <a:rPr lang="en-US" dirty="0" smtClean="0"/>
-              <a:t>Basics in coding</a:t>
+              <a:t>UCSF Chimera and python</a:t>
             </a:r>
             <a:endParaRPr lang="en-US" dirty="0"/>
           </a:p>
@@ -4976,17 +4126,65 @@
           <a:p>
             <a:r>
               <a:rPr lang="en-US" dirty="0" smtClean="0"/>
-              <a:t>High level syntax</a:t>
-            </a:r>
-          </a:p>
-          <a:p>
-            <a:endParaRPr lang="en-US" dirty="0"/>
-          </a:p>
-          <a:p>
+              <a:t>A core in C/C++</a:t>
+            </a:r>
+          </a:p>
+          <a:p>
+            <a:pPr lvl="1"/>
             <a:r>
               <a:rPr lang="en-US" dirty="0" smtClean="0"/>
-              <a:t>i.e. </a:t>
-            </a:r>
+              <a:t>Basics function and objects</a:t>
+            </a:r>
+          </a:p>
+          <a:p>
+            <a:pPr lvl="1"/>
+            <a:r>
+              <a:rPr lang="en-US" dirty="0" smtClean="0"/>
+              <a:t>Fast but not easy to handle for quick access</a:t>
+            </a:r>
+          </a:p>
+          <a:p>
+            <a:r>
+              <a:rPr lang="en-US" dirty="0" smtClean="0"/>
+              <a:t>Everything else</a:t>
+            </a:r>
+            <a:r>
+              <a:rPr lang="en-US" dirty="0"/>
+              <a:t> </a:t>
+            </a:r>
+            <a:r>
+              <a:rPr lang="en-US" dirty="0" smtClean="0"/>
+              <a:t>in </a:t>
+            </a:r>
+            <a:r>
+              <a:rPr lang="en-US" dirty="0" smtClean="0"/>
+              <a:t>Python</a:t>
+            </a:r>
+            <a:endParaRPr lang="en-US" dirty="0" smtClean="0"/>
+          </a:p>
+          <a:p>
+            <a:pPr lvl="1"/>
+            <a:r>
+              <a:rPr lang="en-US" dirty="0" smtClean="0"/>
+              <a:t>The same command line and menu are python interpreted</a:t>
+            </a:r>
+          </a:p>
+          <a:p>
+            <a:pPr lvl="1"/>
+            <a:r>
+              <a:rPr lang="en-US" dirty="0" smtClean="0"/>
+              <a:t>IDLE gives access to the python sublevel</a:t>
+            </a:r>
+          </a:p>
+          <a:p>
+            <a:pPr lvl="2"/>
+            <a:r>
+              <a:rPr lang="en-US" dirty="0" smtClean="0"/>
+              <a:t>From here can drive complex modeling</a:t>
+            </a:r>
+          </a:p>
+          <a:p>
+            <a:pPr lvl="1"/>
             <a:endParaRPr lang="en-US" dirty="0"/>
           </a:p>
         </p:txBody>
@@ -5018,7 +4216,7 @@
     </p:spTree>
     <p:extLst>
       <p:ext uri="{BB962C8B-B14F-4D97-AF65-F5344CB8AC3E}">
-        <p14:creationId xmlns:p14="http://schemas.microsoft.com/office/powerpoint/2010/main" val="137559913"/>
+        <p14:creationId xmlns:p14="http://schemas.microsoft.com/office/powerpoint/2010/main" val="1770853723"/>
       </p:ext>
     </p:extLst>
   </p:cSld>
@@ -5061,8 +4259,16 @@
           <a:lstStyle/>
           <a:p>
             <a:r>
+              <a:rPr lang="en-US" smtClean="0"/>
+              <a:t>Structural </a:t>
+            </a:r>
+            <a:r>
+              <a:rPr lang="en-US" smtClean="0"/>
+              <a:t>Objects </a:t>
+            </a:r>
+            <a:r>
               <a:rPr lang="en-US" dirty="0" smtClean="0"/>
-              <a:t>Hands on:</a:t>
+              <a:t>in chimera</a:t>
             </a:r>
             <a:endParaRPr lang="en-US" dirty="0"/>
           </a:p>
@@ -5085,9 +4291,78 @@
           <a:p>
             <a:r>
               <a:rPr lang="en-US" dirty="0" smtClean="0"/>
-              <a:t>Hello world</a:t>
+              <a:t>Model</a:t>
+            </a:r>
+          </a:p>
+          <a:p>
+            <a:pPr lvl="1"/>
+            <a:r>
+              <a:rPr lang="en-US" dirty="0" smtClean="0"/>
+              <a:t>i.e. models=</a:t>
+            </a:r>
+            <a:r>
+              <a:rPr lang="en-US" dirty="0" err="1" smtClean="0"/>
+              <a:t>chimera.openModels.list</a:t>
+            </a:r>
+            <a:r>
+              <a:rPr lang="en-US" dirty="0" smtClean="0"/>
+              <a:t>()[0]</a:t>
+            </a:r>
+            <a:endParaRPr lang="en-US" dirty="0" smtClean="0"/>
+          </a:p>
+          <a:p>
+            <a:r>
+              <a:rPr lang="en-US" dirty="0" smtClean="0"/>
+              <a:t>Atoms</a:t>
+            </a:r>
+          </a:p>
+          <a:p>
+            <a:pPr lvl="1"/>
+            <a:r>
+              <a:rPr lang="en-US" dirty="0" smtClean="0"/>
+              <a:t>i.e. atoms=</a:t>
+            </a:r>
+            <a:r>
+              <a:rPr lang="en-US" dirty="0" err="1" smtClean="0"/>
+              <a:t>chimera.openModels.list</a:t>
+            </a:r>
+            <a:r>
+              <a:rPr lang="en-US" dirty="0" smtClean="0"/>
+              <a:t>()[0].atoms</a:t>
+            </a:r>
+            <a:endParaRPr lang="en-US" dirty="0" smtClean="0"/>
+          </a:p>
+          <a:p>
+            <a:r>
+              <a:rPr lang="en-US" dirty="0" smtClean="0"/>
+              <a:t>Residues</a:t>
+            </a:r>
+          </a:p>
+          <a:p>
+            <a:pPr lvl="1"/>
+            <a:r>
+              <a:rPr lang="en-US" dirty="0" smtClean="0"/>
+              <a:t>???</a:t>
+            </a:r>
+            <a:endParaRPr lang="en-US" dirty="0" smtClean="0"/>
+          </a:p>
+          <a:p>
+            <a:r>
+              <a:rPr lang="en-US" dirty="0" smtClean="0"/>
+              <a:t>Bonds</a:t>
             </a:r>
             <a:endParaRPr lang="en-US" dirty="0"/>
+          </a:p>
+          <a:p>
+            <a:r>
+              <a:rPr lang="en-US" dirty="0" err="1" smtClean="0"/>
+              <a:t>Etc</a:t>
+            </a:r>
+            <a:r>
+              <a:rPr lang="is-IS" dirty="0" smtClean="0"/>
+              <a:t>…</a:t>
+            </a:r>
+            <a:endParaRPr lang="en-US" dirty="0" smtClean="0"/>
           </a:p>
         </p:txBody>
       </p:sp>
@@ -5118,7 +4393,7 @@
     </p:spTree>
     <p:extLst>
       <p:ext uri="{BB962C8B-B14F-4D97-AF65-F5344CB8AC3E}">
-        <p14:creationId xmlns:p14="http://schemas.microsoft.com/office/powerpoint/2010/main" val="2031254990"/>
+        <p14:creationId xmlns:p14="http://schemas.microsoft.com/office/powerpoint/2010/main" val="1526218690"/>
       </p:ext>
     </p:extLst>
   </p:cSld>
@@ -5158,21 +4433,13 @@
         <p:spPr/>
         <p:txBody>
           <a:bodyPr>
-            <a:normAutofit fontScale="90000"/>
+            <a:normAutofit/>
           </a:bodyPr>
           <a:lstStyle/>
           <a:p>
             <a:r>
               <a:rPr lang="en-US" dirty="0" smtClean="0"/>
-              <a:t>Python embedded </a:t>
-            </a:r>
-            <a:r>
-              <a:rPr lang="en-US" dirty="0" err="1" smtClean="0"/>
-              <a:t>Biomolecular</a:t>
-            </a:r>
-            <a:r>
-              <a:rPr lang="en-US" dirty="0" smtClean="0"/>
-              <a:t> platforms</a:t>
+              <a:t>Hands on!</a:t>
             </a:r>
             <a:endParaRPr lang="en-US" dirty="0"/>
           </a:p>
@@ -5190,36 +4457,47 @@
         </p:nvSpPr>
         <p:spPr/>
         <p:txBody>
-          <a:bodyPr/>
+          <a:bodyPr>
+            <a:normAutofit/>
+          </a:bodyPr>
           <a:lstStyle/>
           <a:p>
             <a:r>
               <a:rPr lang="en-US" dirty="0" smtClean="0"/>
-              <a:t>Behind most visualizing programs:</a:t>
+              <a:t>From now on we will:</a:t>
             </a:r>
           </a:p>
           <a:p>
             <a:pPr lvl="1"/>
             <a:r>
-              <a:rPr lang="en-US" dirty="0" err="1" smtClean="0"/>
-              <a:t>Pymol</a:t>
+              <a:rPr lang="en-US" dirty="0" smtClean="0"/>
+              <a:t>Move from menu to command line</a:t>
+            </a:r>
+          </a:p>
+          <a:p>
+            <a:pPr lvl="1"/>
+            <a:r>
+              <a:rPr lang="en-US" dirty="0" smtClean="0"/>
+              <a:t>From command line to script</a:t>
+            </a:r>
+          </a:p>
+          <a:p>
+            <a:pPr lvl="1"/>
+            <a:r>
+              <a:rPr lang="en-US" dirty="0" smtClean="0"/>
+              <a:t>Embed command line in scripts</a:t>
+            </a:r>
+          </a:p>
+          <a:p>
+            <a:pPr lvl="1"/>
+            <a:endParaRPr lang="en-US" dirty="0"/>
+          </a:p>
+          <a:p>
+            <a:r>
+              <a:rPr lang="en-US" dirty="0" smtClean="0"/>
+              <a:t>Produce and have fun (hopefully)</a:t>
             </a:r>
             <a:endParaRPr lang="en-US" dirty="0" smtClean="0"/>
-          </a:p>
-          <a:p>
-            <a:pPr lvl="1"/>
-            <a:r>
-              <a:rPr lang="en-US" dirty="0" smtClean="0"/>
-              <a:t>Chimera</a:t>
-            </a:r>
-          </a:p>
-          <a:p>
-            <a:pPr lvl="1"/>
-            <a:r>
-              <a:rPr lang="en-US" dirty="0" smtClean="0"/>
-              <a:t>Etc.</a:t>
-            </a:r>
-            <a:endParaRPr lang="en-US" dirty="0"/>
           </a:p>
         </p:txBody>
       </p:sp>
@@ -5250,222 +4528,7 @@
     </p:spTree>
     <p:extLst>
       <p:ext uri="{BB962C8B-B14F-4D97-AF65-F5344CB8AC3E}">
-        <p14:creationId xmlns:p14="http://schemas.microsoft.com/office/powerpoint/2010/main" val="549964489"/>
-      </p:ext>
-    </p:extLst>
-  </p:cSld>
-  <p:clrMapOvr>
-    <a:masterClrMapping/>
-  </p:clrMapOvr>
-</p:sld>
-</file>
-
-<file path=ppt/slides/slide8.xml><?xml version="1.0" encoding="utf-8"?>
-<p:sld xmlns:a="http://schemas.openxmlformats.org/drawingml/2006/main" xmlns:r="http://schemas.openxmlformats.org/officeDocument/2006/relationships" xmlns:p="http://schemas.openxmlformats.org/presentationml/2006/main">
-  <p:cSld>
-    <p:spTree>
-      <p:nvGrpSpPr>
-        <p:cNvPr id="1" name=""/>
-        <p:cNvGrpSpPr/>
-        <p:nvPr/>
-      </p:nvGrpSpPr>
-      <p:grpSpPr>
-        <a:xfrm>
-          <a:off x="0" y="0"/>
-          <a:ext cx="0" cy="0"/>
-          <a:chOff x="0" y="0"/>
-          <a:chExt cx="0" cy="0"/>
-        </a:xfrm>
-      </p:grpSpPr>
-      <p:sp>
-        <p:nvSpPr>
-          <p:cNvPr id="2" name="Title 1"/>
-          <p:cNvSpPr>
-            <a:spLocks noGrp="1"/>
-          </p:cNvSpPr>
-          <p:nvPr>
-            <p:ph type="title"/>
-          </p:nvPr>
-        </p:nvSpPr>
-        <p:spPr/>
-        <p:txBody>
-          <a:bodyPr/>
-          <a:lstStyle/>
-          <a:p>
-            <a:r>
-              <a:rPr lang="en-US" dirty="0" smtClean="0"/>
-              <a:t>UCSF Chimera and python</a:t>
-            </a:r>
-            <a:endParaRPr lang="en-US" dirty="0"/>
-          </a:p>
-        </p:txBody>
-      </p:sp>
-      <p:sp>
-        <p:nvSpPr>
-          <p:cNvPr id="3" name="Content Placeholder 2"/>
-          <p:cNvSpPr>
-            <a:spLocks noGrp="1"/>
-          </p:cNvSpPr>
-          <p:nvPr>
-            <p:ph idx="1"/>
-          </p:nvPr>
-        </p:nvSpPr>
-        <p:spPr/>
-        <p:txBody>
-          <a:bodyPr/>
-          <a:lstStyle/>
-          <a:p>
-            <a:r>
-              <a:rPr lang="en-US" dirty="0" smtClean="0"/>
-              <a:t>Basics:</a:t>
-            </a:r>
-          </a:p>
-          <a:p>
-            <a:pPr lvl="1"/>
-            <a:r>
-              <a:rPr lang="en-US" dirty="0" smtClean="0"/>
-              <a:t>How to reach the python layer into </a:t>
-            </a:r>
-            <a:r>
-              <a:rPr lang="en-US" dirty="0" err="1" smtClean="0"/>
-              <a:t>ucsf</a:t>
-            </a:r>
-            <a:r>
-              <a:rPr lang="en-US" dirty="0" smtClean="0"/>
-              <a:t> Chimera</a:t>
-            </a:r>
-          </a:p>
-          <a:p>
-            <a:pPr lvl="1"/>
-            <a:r>
-              <a:rPr lang="en-US" dirty="0" smtClean="0"/>
-              <a:t>IDLE</a:t>
-            </a:r>
-          </a:p>
-          <a:p>
-            <a:pPr lvl="1"/>
-            <a:r>
-              <a:rPr lang="en-US" dirty="0" err="1" smtClean="0"/>
-              <a:t>Imagenes</a:t>
-            </a:r>
-            <a:endParaRPr lang="en-US" dirty="0" smtClean="0"/>
-          </a:p>
-          <a:p>
-            <a:pPr lvl="1"/>
-            <a:endParaRPr lang="en-US" dirty="0"/>
-          </a:p>
-        </p:txBody>
-      </p:sp>
-      <p:sp>
-        <p:nvSpPr>
-          <p:cNvPr id="4" name="Slide Number Placeholder 3"/>
-          <p:cNvSpPr>
-            <a:spLocks noGrp="1"/>
-          </p:cNvSpPr>
-          <p:nvPr>
-            <p:ph type="sldNum" sz="quarter" idx="12"/>
-          </p:nvPr>
-        </p:nvSpPr>
-        <p:spPr/>
-        <p:txBody>
-          <a:bodyPr/>
-          <a:lstStyle/>
-          <a:p>
-            <a:fld id="{9F2F5E10-5301-4EE6-90D2-A6C4A3F62BED}" type="slidenum">
-              <a:rPr lang="en-US" smtClean="0"/>
-              <a:pPr/>
-              <a:t>8</a:t>
-            </a:fld>
-            <a:endParaRPr lang="en-US" dirty="0"/>
-          </a:p>
-        </p:txBody>
-      </p:sp>
-    </p:spTree>
-    <p:extLst>
-      <p:ext uri="{BB962C8B-B14F-4D97-AF65-F5344CB8AC3E}">
-        <p14:creationId xmlns:p14="http://schemas.microsoft.com/office/powerpoint/2010/main" val="1770853723"/>
-      </p:ext>
-    </p:extLst>
-  </p:cSld>
-  <p:clrMapOvr>
-    <a:masterClrMapping/>
-  </p:clrMapOvr>
-</p:sld>
-</file>
-
-<file path=ppt/slides/slide9.xml><?xml version="1.0" encoding="utf-8"?>
-<p:sld xmlns:a="http://schemas.openxmlformats.org/drawingml/2006/main" xmlns:r="http://schemas.openxmlformats.org/officeDocument/2006/relationships" xmlns:p="http://schemas.openxmlformats.org/presentationml/2006/main">
-  <p:cSld>
-    <p:spTree>
-      <p:nvGrpSpPr>
-        <p:cNvPr id="1" name=""/>
-        <p:cNvGrpSpPr/>
-        <p:nvPr/>
-      </p:nvGrpSpPr>
-      <p:grpSpPr>
-        <a:xfrm>
-          <a:off x="0" y="0"/>
-          <a:ext cx="0" cy="0"/>
-          <a:chOff x="0" y="0"/>
-          <a:chExt cx="0" cy="0"/>
-        </a:xfrm>
-      </p:grpSpPr>
-      <p:sp>
-        <p:nvSpPr>
-          <p:cNvPr id="3" name="Content Placeholder 2"/>
-          <p:cNvSpPr>
-            <a:spLocks noGrp="1"/>
-          </p:cNvSpPr>
-          <p:nvPr>
-            <p:ph idx="1"/>
-          </p:nvPr>
-        </p:nvSpPr>
-        <p:spPr>
-          <a:xfrm>
-            <a:off x="457200" y="558800"/>
-            <a:ext cx="8229600" cy="5567363"/>
-          </a:xfrm>
-        </p:spPr>
-        <p:txBody>
-          <a:bodyPr/>
-          <a:lstStyle/>
-          <a:p>
-            <a:r>
-              <a:rPr lang="en-US" dirty="0" smtClean="0"/>
-              <a:t>Hello world inside Chimera</a:t>
-            </a:r>
-            <a:endParaRPr lang="en-US" dirty="0"/>
-          </a:p>
-        </p:txBody>
-      </p:sp>
-      <p:sp>
-        <p:nvSpPr>
-          <p:cNvPr id="4" name="Slide Number Placeholder 3"/>
-          <p:cNvSpPr>
-            <a:spLocks noGrp="1"/>
-          </p:cNvSpPr>
-          <p:nvPr>
-            <p:ph type="sldNum" sz="quarter" idx="12"/>
-          </p:nvPr>
-        </p:nvSpPr>
-        <p:spPr/>
-        <p:txBody>
-          <a:bodyPr/>
-          <a:lstStyle/>
-          <a:p>
-            <a:fld id="{9F2F5E10-5301-4EE6-90D2-A6C4A3F62BED}" type="slidenum">
-              <a:rPr lang="en-US" smtClean="0"/>
-              <a:pPr/>
-              <a:t>9</a:t>
-            </a:fld>
-            <a:endParaRPr lang="en-US" dirty="0"/>
-          </a:p>
-        </p:txBody>
-      </p:sp>
-    </p:spTree>
-    <p:extLst>
-      <p:ext uri="{BB962C8B-B14F-4D97-AF65-F5344CB8AC3E}">
-        <p14:creationId xmlns:p14="http://schemas.microsoft.com/office/powerpoint/2010/main" val="884551871"/>
+        <p14:creationId xmlns:p14="http://schemas.microsoft.com/office/powerpoint/2010/main" val="578425333"/>
       </p:ext>
     </p:extLst>
   </p:cSld>

</xml_diff>